<commit_message>
Update ui_drum_machine.pptx removing power component
</commit_message>
<xml_diff>
--- a/ui_drum_machine.pptx
+++ b/ui_drum_machine.pptx
@@ -106,6 +106,11 @@
       </a:defRPr>
     </a:lvl9pPr>
   </p:defaultTextStyle>
+  <p:extLst>
+    <p:ext uri="{EFAFB233-063F-42B5-8137-9DF3F51BA10A}">
+      <p15:sldGuideLst xmlns:p15="http://schemas.microsoft.com/office/powerpoint/2012/main"/>
+    </p:ext>
+  </p:extLst>
 </p:presentation>
 </file>
 
@@ -3367,7 +3372,7 @@
             <a:pPr algn="ctr"/>
             <a:r>
               <a:rPr lang="en-US" dirty="0"/>
-              <a:t># drum-machine</a:t>
+              <a:t>#drum-machine</a:t>
             </a:r>
           </a:p>
         </p:txBody>
@@ -3648,8 +3653,8 @@
         </p:nvSpPr>
         <p:spPr>
           <a:xfrm>
-            <a:off x="6046046" y="1046922"/>
-            <a:ext cx="2687647" cy="516835"/>
+            <a:off x="4280962" y="1046922"/>
+            <a:ext cx="4452731" cy="516835"/>
           </a:xfrm>
           <a:prstGeom prst="rect">
             <a:avLst/>
@@ -4269,58 +4274,6 @@
           </p:txBody>
         </p:sp>
       </p:grpSp>
-      <p:sp>
-        <p:nvSpPr>
-          <p:cNvPr id="17" name="Rectangle 16">
-            <a:extLst>
-              <a:ext uri="{FF2B5EF4-FFF2-40B4-BE49-F238E27FC236}">
-                <a16:creationId xmlns:a16="http://schemas.microsoft.com/office/drawing/2014/main" id="{C982DE2D-3B66-44BB-B4A2-638D8B88ED98}"/>
-              </a:ext>
-            </a:extLst>
-          </p:cNvPr>
-          <p:cNvSpPr/>
-          <p:nvPr/>
-        </p:nvSpPr>
-        <p:spPr>
-          <a:xfrm>
-            <a:off x="4280962" y="1040296"/>
-            <a:ext cx="1312599" cy="516835"/>
-          </a:xfrm>
-          <a:prstGeom prst="rect">
-            <a:avLst/>
-          </a:prstGeom>
-          <a:solidFill>
-            <a:schemeClr val="accent2"/>
-          </a:solidFill>
-        </p:spPr>
-        <p:style>
-          <a:lnRef idx="2">
-            <a:schemeClr val="accent1">
-              <a:shade val="50000"/>
-            </a:schemeClr>
-          </a:lnRef>
-          <a:fillRef idx="1">
-            <a:schemeClr val="accent1"/>
-          </a:fillRef>
-          <a:effectRef idx="0">
-            <a:schemeClr val="accent1"/>
-          </a:effectRef>
-          <a:fontRef idx="minor">
-            <a:schemeClr val="lt1"/>
-          </a:fontRef>
-        </p:style>
-        <p:txBody>
-          <a:bodyPr rtlCol="0" anchor="ctr"/>
-          <a:lstStyle/>
-          <a:p>
-            <a:pPr algn="ctr"/>
-            <a:r>
-              <a:rPr lang="en-US" dirty="0"/>
-              <a:t>#power</a:t>
-            </a:r>
-          </a:p>
-        </p:txBody>
-      </p:sp>
     </p:spTree>
     <p:extLst>
       <p:ext uri="{BB962C8B-B14F-4D97-AF65-F5344CB8AC3E}">

</xml_diff>